<commit_message>
-created Implementation segment for Scheduling module
</commit_message>
<xml_diff>
--- a/docs/diagrams/DeleteBeforeSequenceDiagram.pptx
+++ b/docs/diagrams/DeleteBeforeSequenceDiagram.pptx
@@ -126,6 +126,10 @@
 </p:presentation>
 </file>
 
+<file path=ppt/revisionInfo.xml><?xml version="1.0" encoding="utf-8"?>
+<p1510:revInfo xmlns:a="http://schemas.openxmlformats.org/drawingml/2006/main" xmlns:r="http://schemas.openxmlformats.org/officeDocument/2006/relationships" xmlns:p1510="http://schemas.microsoft.com/office/powerpoint/2015/10/main"/>
+</file>
+
 <file path=ppt/notesMasters/notesMaster1.xml><?xml version="1.0" encoding="utf-8"?>
 <p:notesMaster xmlns:a="http://schemas.openxmlformats.org/drawingml/2006/main" xmlns:r="http://schemas.openxmlformats.org/officeDocument/2006/relationships" xmlns:p="http://schemas.openxmlformats.org/presentationml/2006/main">
   <p:cSld>
@@ -208,7 +212,7 @@
           <a:p>
             <a:fld id="{F5CC4B3F-88C1-4FFA-B1B6-F41C21DC6924}" type="datetimeFigureOut">
               <a:rPr lang="en-US" smtClean="0"/>
-              <a:t>3/20/2018</a:t>
+              <a:t>4/3/2018</a:t>
             </a:fld>
             <a:endParaRPr lang="en-US"/>
           </a:p>
@@ -738,7 +742,7 @@
           <a:p>
             <a:fld id="{78C97017-6FC3-485B-9764-EAC9E56C1D49}" type="datetimeFigureOut">
               <a:rPr lang="en-US" smtClean="0"/>
-              <a:t>3/20/2018</a:t>
+              <a:t>4/3/2018</a:t>
             </a:fld>
             <a:endParaRPr lang="en-US"/>
           </a:p>
@@ -906,7 +910,7 @@
           <a:p>
             <a:fld id="{78C97017-6FC3-485B-9764-EAC9E56C1D49}" type="datetimeFigureOut">
               <a:rPr lang="en-US" smtClean="0"/>
-              <a:t>3/20/2018</a:t>
+              <a:t>4/3/2018</a:t>
             </a:fld>
             <a:endParaRPr lang="en-US"/>
           </a:p>
@@ -1084,7 +1088,7 @@
           <a:p>
             <a:fld id="{78C97017-6FC3-485B-9764-EAC9E56C1D49}" type="datetimeFigureOut">
               <a:rPr lang="en-US" smtClean="0"/>
-              <a:t>3/20/2018</a:t>
+              <a:t>4/3/2018</a:t>
             </a:fld>
             <a:endParaRPr lang="en-US"/>
           </a:p>
@@ -1252,7 +1256,7 @@
           <a:p>
             <a:fld id="{78C97017-6FC3-485B-9764-EAC9E56C1D49}" type="datetimeFigureOut">
               <a:rPr lang="en-US" smtClean="0"/>
-              <a:t>3/20/2018</a:t>
+              <a:t>4/3/2018</a:t>
             </a:fld>
             <a:endParaRPr lang="en-US"/>
           </a:p>
@@ -1497,7 +1501,7 @@
           <a:p>
             <a:fld id="{78C97017-6FC3-485B-9764-EAC9E56C1D49}" type="datetimeFigureOut">
               <a:rPr lang="en-US" smtClean="0"/>
-              <a:t>3/20/2018</a:t>
+              <a:t>4/3/2018</a:t>
             </a:fld>
             <a:endParaRPr lang="en-US"/>
           </a:p>
@@ -1782,7 +1786,7 @@
           <a:p>
             <a:fld id="{78C97017-6FC3-485B-9764-EAC9E56C1D49}" type="datetimeFigureOut">
               <a:rPr lang="en-US" smtClean="0"/>
-              <a:t>3/20/2018</a:t>
+              <a:t>4/3/2018</a:t>
             </a:fld>
             <a:endParaRPr lang="en-US"/>
           </a:p>
@@ -2201,7 +2205,7 @@
           <a:p>
             <a:fld id="{78C97017-6FC3-485B-9764-EAC9E56C1D49}" type="datetimeFigureOut">
               <a:rPr lang="en-US" smtClean="0"/>
-              <a:t>3/20/2018</a:t>
+              <a:t>4/3/2018</a:t>
             </a:fld>
             <a:endParaRPr lang="en-US"/>
           </a:p>
@@ -2318,7 +2322,7 @@
           <a:p>
             <a:fld id="{78C97017-6FC3-485B-9764-EAC9E56C1D49}" type="datetimeFigureOut">
               <a:rPr lang="en-US" smtClean="0"/>
-              <a:t>3/20/2018</a:t>
+              <a:t>4/3/2018</a:t>
             </a:fld>
             <a:endParaRPr lang="en-US"/>
           </a:p>
@@ -2413,7 +2417,7 @@
           <a:p>
             <a:fld id="{78C97017-6FC3-485B-9764-EAC9E56C1D49}" type="datetimeFigureOut">
               <a:rPr lang="en-US" smtClean="0"/>
-              <a:t>3/20/2018</a:t>
+              <a:t>4/3/2018</a:t>
             </a:fld>
             <a:endParaRPr lang="en-US"/>
           </a:p>
@@ -2688,7 +2692,7 @@
           <a:p>
             <a:fld id="{78C97017-6FC3-485B-9764-EAC9E56C1D49}" type="datetimeFigureOut">
               <a:rPr lang="en-US" smtClean="0"/>
-              <a:t>3/20/2018</a:t>
+              <a:t>4/3/2018</a:t>
             </a:fld>
             <a:endParaRPr lang="en-US"/>
           </a:p>
@@ -2940,7 +2944,7 @@
           <a:p>
             <a:fld id="{78C97017-6FC3-485B-9764-EAC9E56C1D49}" type="datetimeFigureOut">
               <a:rPr lang="en-US" smtClean="0"/>
-              <a:t>3/20/2018</a:t>
+              <a:t>4/3/2018</a:t>
             </a:fld>
             <a:endParaRPr lang="en-US"/>
           </a:p>
@@ -3151,7 +3155,7 @@
           <a:p>
             <a:fld id="{78C97017-6FC3-485B-9764-EAC9E56C1D49}" type="datetimeFigureOut">
               <a:rPr lang="en-US" smtClean="0"/>
-              <a:t>3/20/2018</a:t>
+              <a:t>4/3/2018</a:t>
             </a:fld>
             <a:endParaRPr lang="en-US"/>
           </a:p>
@@ -6619,9 +6623,7 @@
             </a:schemeClr>
           </a:solidFill>
           <a:ln w="19050">
-            <a:solidFill>
-              <a:srgbClr val="E6E6E6"/>
-            </a:solidFill>
+            <a:noFill/>
           </a:ln>
           <a:effectLst/>
         </p:spPr>
@@ -6744,12 +6746,7 @@
             </a:schemeClr>
           </a:solidFill>
           <a:ln>
-            <a:solidFill>
-              <a:schemeClr val="accent4">
-                <a:lumMod val="60000"/>
-                <a:lumOff val="40000"/>
-              </a:schemeClr>
-            </a:solidFill>
+            <a:noFill/>
           </a:ln>
           <a:effectLst/>
         </p:spPr>

</xml_diff>